<commit_message>
Stages for the past few weeks
</commit_message>
<xml_diff>
--- a/- Stage Design - USPSA New.pptx
+++ b/- Stage Design - USPSA New.pptx
@@ -259,7 +259,7 @@
               <a:pPr>
                 <a:defRPr/>
               </a:pPr>
-              <a:t>6/19/2020</a:t>
+              <a:t>6/20/2022</a:t>
             </a:fld>
             <a:endParaRPr lang="en-US"/>
           </a:p>
@@ -4164,7 +4164,7 @@
           <p:nvPr>
             <p:extLst>
               <p:ext uri="{D42A27DB-BD31-4B8C-83A1-F6EECF244321}">
-                <p14:modId xmlns:p14="http://schemas.microsoft.com/office/powerpoint/2010/main" val="932557658"/>
+                <p14:modId xmlns:p14="http://schemas.microsoft.com/office/powerpoint/2010/main" val="2527048657"/>
               </p:ext>
             </p:extLst>
           </p:nvPr>
@@ -4370,6 +4370,39 @@
                         <a:t>Course Designer : Drew Coleman</a:t>
                       </a:r>
                     </a:p>
+                    <a:p>
+                      <a:pPr marL="0" marR="0" lvl="0" indent="0" algn="ctr" defTabSz="966788" rtl="0" eaLnBrk="1" fontAlgn="base" latinLnBrk="0" hangingPunct="1">
+                        <a:lnSpc>
+                          <a:spcPct val="100000"/>
+                        </a:lnSpc>
+                        <a:spcBef>
+                          <a:spcPct val="35000"/>
+                        </a:spcBef>
+                        <a:spcAft>
+                          <a:spcPct val="0"/>
+                        </a:spcAft>
+                        <a:buClrTx/>
+                        <a:buSzTx/>
+                        <a:buFontTx/>
+                        <a:buNone/>
+                        <a:tabLst/>
+                      </a:pPr>
+                      <a:r>
+                        <a:rPr kumimoji="0" lang="en-US" sz="1200" b="1" i="0" u="none" strike="noStrike" cap="none" normalizeH="0" baseline="0" dirty="0">
+                          <a:ln>
+                            <a:noFill/>
+                          </a:ln>
+                          <a:solidFill>
+                            <a:schemeClr val="tx1"/>
+                          </a:solidFill>
+                          <a:effectLst/>
+                          <a:latin typeface="Arial" charset="0"/>
+                          <a:ea typeface="ＭＳ Ｐゴシック" pitchFamily="-112" charset="-128"/>
+                          <a:cs typeface="Times New Roman" pitchFamily="-112" charset="0"/>
+                        </a:rPr>
+                        <a:t>Bay: </a:t>
+                      </a:r>
+                    </a:p>
                   </a:txBody>
                   <a:tcPr marL="45720" marR="45720" anchor="ctr" horzOverflow="overflow">
                     <a:lnL w="28575" cap="flat" cmpd="sng" algn="ctr">
@@ -4538,6 +4571,36 @@
                         </a:rPr>
                         <a:t>Round Count</a:t>
                       </a:r>
+                    </a:p>
+                    <a:p>
+                      <a:pPr marL="0" marR="0" lvl="0" indent="0" algn="l" defTabSz="966788" rtl="0" eaLnBrk="0" fontAlgn="base" latinLnBrk="0" hangingPunct="0">
+                        <a:lnSpc>
+                          <a:spcPct val="100000"/>
+                        </a:lnSpc>
+                        <a:spcBef>
+                          <a:spcPct val="0"/>
+                        </a:spcBef>
+                        <a:spcAft>
+                          <a:spcPct val="0"/>
+                        </a:spcAft>
+                        <a:buClrTx/>
+                        <a:buSzTx/>
+                        <a:buFontTx/>
+                        <a:buNone/>
+                        <a:tabLst/>
+                      </a:pPr>
+                      <a:endParaRPr kumimoji="0" lang="en-US" sz="1100" b="1" i="0" u="none" strike="noStrike" cap="none" normalizeH="0" baseline="0" dirty="0">
+                        <a:ln>
+                          <a:noFill/>
+                        </a:ln>
+                        <a:solidFill>
+                          <a:schemeClr val="tx1"/>
+                        </a:solidFill>
+                        <a:effectLst/>
+                        <a:latin typeface="Arial" charset="0"/>
+                        <a:ea typeface="ＭＳ Ｐゴシック" pitchFamily="-112" charset="-128"/>
+                        <a:cs typeface="Times New Roman" pitchFamily="-112" charset="0"/>
+                      </a:endParaRPr>
                     </a:p>
                   </a:txBody>
                   <a:tcPr marL="18288" marR="18288" marT="27433" marB="27433" horzOverflow="overflow">
@@ -4798,6 +4861,36 @@
                         <a:t>Equipment List</a:t>
                       </a:r>
                     </a:p>
+                    <a:p>
+                      <a:pPr marL="0" marR="0" lvl="0" indent="0" algn="l" defTabSz="966788" rtl="0" eaLnBrk="0" fontAlgn="base" latinLnBrk="0" hangingPunct="0">
+                        <a:lnSpc>
+                          <a:spcPct val="100000"/>
+                        </a:lnSpc>
+                        <a:spcBef>
+                          <a:spcPct val="0"/>
+                        </a:spcBef>
+                        <a:spcAft>
+                          <a:spcPct val="0"/>
+                        </a:spcAft>
+                        <a:buClrTx/>
+                        <a:buSzTx/>
+                        <a:buFontTx/>
+                        <a:buNone/>
+                        <a:tabLst/>
+                      </a:pPr>
+                      <a:endParaRPr kumimoji="0" lang="en-US" sz="1100" b="1" i="0" u="none" strike="noStrike" cap="none" normalizeH="0" baseline="0" dirty="0">
+                        <a:ln>
+                          <a:noFill/>
+                        </a:ln>
+                        <a:solidFill>
+                          <a:schemeClr val="tx1"/>
+                        </a:solidFill>
+                        <a:effectLst/>
+                        <a:latin typeface="Arial" charset="0"/>
+                        <a:ea typeface="ＭＳ Ｐゴシック" pitchFamily="-112" charset="-128"/>
+                        <a:cs typeface="Times New Roman" pitchFamily="-112" charset="0"/>
+                      </a:endParaRPr>
+                    </a:p>
                   </a:txBody>
                   <a:tcPr marL="18288" marR="18288" marT="27433" marB="27433" horzOverflow="overflow">
                     <a:lnL w="28575" cap="flat" cmpd="sng" algn="ctr">
@@ -4998,7 +5091,7 @@
         <p:spPr>
           <a:xfrm>
             <a:off x="341833" y="384562"/>
-            <a:ext cx="6699903" cy="2585323"/>
+            <a:ext cx="6699903" cy="3139321"/>
           </a:xfrm>
           <a:prstGeom prst="rect">
             <a:avLst/>
@@ -5027,7 +5120,20 @@
           <a:p>
             <a:r>
               <a:rPr lang="en-US" dirty="0"/>
-              <a:t>Description.</a:t>
+              <a:t>Scoring: </a:t>
+            </a:r>
+            <a:br>
+              <a:rPr lang="en-US" dirty="0"/>
+            </a:br>
+            <a:r>
+              <a:rPr lang="en-US" dirty="0"/>
+              <a:t>Rounds: </a:t>
+            </a:r>
+          </a:p>
+          <a:p>
+            <a:r>
+              <a:rPr lang="en-US" dirty="0"/>
+              <a:t>Targets: </a:t>
             </a:r>
           </a:p>
           <a:p>
@@ -5036,7 +5142,7 @@
           <a:p>
             <a:r>
               <a:rPr lang="en-US" dirty="0"/>
-              <a:t>Handgun start position</a:t>
+              <a:t>Handgun start position: </a:t>
             </a:r>
           </a:p>
           <a:p>
@@ -5045,7 +5151,7 @@
           <a:p>
             <a:r>
               <a:rPr lang="en-US" dirty="0"/>
-              <a:t>PCC start position</a:t>
+              <a:t>PCC start position: </a:t>
             </a:r>
           </a:p>
           <a:p>
@@ -5054,7 +5160,7 @@
           <a:p>
             <a:r>
               <a:rPr lang="en-US" dirty="0"/>
-              <a:t>Stage Procedure</a:t>
+              <a:t>Stage Procedure: </a:t>
             </a:r>
           </a:p>
         </p:txBody>

</xml_diff>